<commit_message>
add image classification presentation video
</commit_message>
<xml_diff>
--- a/MySEProject/Documentation/Analyze Image classification on simple shapes.pptx
+++ b/MySEProject/Documentation/Analyze Image classification on simple shapes.pptx
@@ -2125,6 +2125,345 @@
     </pc:docChg>
   </pc:docChgLst>
   <pc:docChgLst>
+    <pc:chgData name="Gurunag Sai Udaykumar" userId="44ad0e2733d7a09f" providerId="Windows Live" clId="Web-{18D27D60-2666-4E71-90C6-1D84DB9FAFF4}"/>
+    <pc:docChg chg="addSld delSld modSld">
+      <pc:chgData name="Gurunag Sai Udaykumar" userId="44ad0e2733d7a09f" providerId="Windows Live" clId="Web-{18D27D60-2666-4E71-90C6-1D84DB9FAFF4}" dt="2022-03-27T21:25:47.437" v="535" actId="20577"/>
+      <pc:docMkLst>
+        <pc:docMk/>
+      </pc:docMkLst>
+      <pc:sldChg chg="addSp delSp modSp">
+        <pc:chgData name="Gurunag Sai Udaykumar" userId="44ad0e2733d7a09f" providerId="Windows Live" clId="Web-{18D27D60-2666-4E71-90C6-1D84DB9FAFF4}" dt="2022-03-27T19:44:46.836" v="245" actId="1076"/>
+        <pc:sldMkLst>
+          <pc:docMk/>
+          <pc:sldMk cId="1273893743" sldId="260"/>
+        </pc:sldMkLst>
+        <pc:spChg chg="del">
+          <ac:chgData name="Gurunag Sai Udaykumar" userId="44ad0e2733d7a09f" providerId="Windows Live" clId="Web-{18D27D60-2666-4E71-90C6-1D84DB9FAFF4}" dt="2022-03-27T18:02:07.513" v="0"/>
+          <ac:spMkLst>
+            <pc:docMk/>
+            <pc:sldMk cId="1273893743" sldId="260"/>
+            <ac:spMk id="3" creationId="{AA989D50-C831-850F-6E29-BE1FCF9A18B4}"/>
+          </ac:spMkLst>
+        </pc:spChg>
+        <pc:spChg chg="add del">
+          <ac:chgData name="Gurunag Sai Udaykumar" userId="44ad0e2733d7a09f" providerId="Windows Live" clId="Web-{18D27D60-2666-4E71-90C6-1D84DB9FAFF4}" dt="2022-03-27T19:43:30.710" v="181"/>
+          <ac:spMkLst>
+            <pc:docMk/>
+            <pc:sldMk cId="1273893743" sldId="260"/>
+            <ac:spMk id="3" creationId="{ECF1FC14-1319-1DAA-1807-4961FB44D50D}"/>
+          </ac:spMkLst>
+        </pc:spChg>
+        <pc:spChg chg="add mod">
+          <ac:chgData name="Gurunag Sai Udaykumar" userId="44ad0e2733d7a09f" providerId="Windows Live" clId="Web-{18D27D60-2666-4E71-90C6-1D84DB9FAFF4}" dt="2022-03-27T19:44:15.305" v="222" actId="20577"/>
+          <ac:spMkLst>
+            <pc:docMk/>
+            <pc:sldMk cId="1273893743" sldId="260"/>
+            <ac:spMk id="5" creationId="{896E1F6E-D38F-0498-60A8-AC54500B0507}"/>
+          </ac:spMkLst>
+        </pc:spChg>
+        <pc:spChg chg="add mod">
+          <ac:chgData name="Gurunag Sai Udaykumar" userId="44ad0e2733d7a09f" providerId="Windows Live" clId="Web-{18D27D60-2666-4E71-90C6-1D84DB9FAFF4}" dt="2022-03-27T19:44:46.836" v="245" actId="1076"/>
+          <ac:spMkLst>
+            <pc:docMk/>
+            <pc:sldMk cId="1273893743" sldId="260"/>
+            <ac:spMk id="6" creationId="{5045DC78-609F-230B-0816-79878D03D32A}"/>
+          </ac:spMkLst>
+        </pc:spChg>
+        <pc:picChg chg="add mod ord">
+          <ac:chgData name="Gurunag Sai Udaykumar" userId="44ad0e2733d7a09f" providerId="Windows Live" clId="Web-{18D27D60-2666-4E71-90C6-1D84DB9FAFF4}" dt="2022-03-27T18:02:13.279" v="2" actId="1076"/>
+          <ac:picMkLst>
+            <pc:docMk/>
+            <pc:sldMk cId="1273893743" sldId="260"/>
+            <ac:picMk id="4" creationId="{D8806051-B72E-B2FB-1165-831640EE721F}"/>
+          </ac:picMkLst>
+        </pc:picChg>
+      </pc:sldChg>
+      <pc:sldChg chg="addSp delSp modSp">
+        <pc:chgData name="Gurunag Sai Udaykumar" userId="44ad0e2733d7a09f" providerId="Windows Live" clId="Web-{18D27D60-2666-4E71-90C6-1D84DB9FAFF4}" dt="2022-03-27T19:47:24.464" v="370" actId="20577"/>
+        <pc:sldMkLst>
+          <pc:docMk/>
+          <pc:sldMk cId="4093855891" sldId="261"/>
+        </pc:sldMkLst>
+        <pc:spChg chg="mod">
+          <ac:chgData name="Gurunag Sai Udaykumar" userId="44ad0e2733d7a09f" providerId="Windows Live" clId="Web-{18D27D60-2666-4E71-90C6-1D84DB9FAFF4}" dt="2022-03-27T18:03:23.360" v="6" actId="20577"/>
+          <ac:spMkLst>
+            <pc:docMk/>
+            <pc:sldMk cId="4093855891" sldId="261"/>
+            <ac:spMk id="2" creationId="{1138663A-ADA1-EC99-08C6-7CD74C34AC8C}"/>
+          </ac:spMkLst>
+        </pc:spChg>
+        <pc:spChg chg="del">
+          <ac:chgData name="Gurunag Sai Udaykumar" userId="44ad0e2733d7a09f" providerId="Windows Live" clId="Web-{18D27D60-2666-4E71-90C6-1D84DB9FAFF4}" dt="2022-03-27T18:03:47.892" v="7"/>
+          <ac:spMkLst>
+            <pc:docMk/>
+            <pc:sldMk cId="4093855891" sldId="261"/>
+            <ac:spMk id="3" creationId="{2AD8E59A-601B-9713-314C-ABA9CC2BE482}"/>
+          </ac:spMkLst>
+        </pc:spChg>
+        <pc:spChg chg="add mod">
+          <ac:chgData name="Gurunag Sai Udaykumar" userId="44ad0e2733d7a09f" providerId="Windows Live" clId="Web-{18D27D60-2666-4E71-90C6-1D84DB9FAFF4}" dt="2022-03-27T19:46:24.307" v="318" actId="1076"/>
+          <ac:spMkLst>
+            <pc:docMk/>
+            <pc:sldMk cId="4093855891" sldId="261"/>
+            <ac:spMk id="3" creationId="{DEBEFA2A-A471-951C-F22C-AFCED7C6AF7C}"/>
+          </ac:spMkLst>
+        </pc:spChg>
+        <pc:spChg chg="add del mod">
+          <ac:chgData name="Gurunag Sai Udaykumar" userId="44ad0e2733d7a09f" providerId="Windows Live" clId="Web-{18D27D60-2666-4E71-90C6-1D84DB9FAFF4}" dt="2022-03-27T18:06:01.584" v="55"/>
+          <ac:spMkLst>
+            <pc:docMk/>
+            <pc:sldMk cId="4093855891" sldId="261"/>
+            <ac:spMk id="6" creationId="{342BEFC5-BD1D-D428-2C4B-F26677226015}"/>
+          </ac:spMkLst>
+        </pc:spChg>
+        <pc:spChg chg="add mod">
+          <ac:chgData name="Gurunag Sai Udaykumar" userId="44ad0e2733d7a09f" providerId="Windows Live" clId="Web-{18D27D60-2666-4E71-90C6-1D84DB9FAFF4}" dt="2022-03-27T19:47:24.464" v="370" actId="20577"/>
+          <ac:spMkLst>
+            <pc:docMk/>
+            <pc:sldMk cId="4093855891" sldId="261"/>
+            <ac:spMk id="7" creationId="{8916C0EA-1B25-5194-7767-2C44D67D8916}"/>
+          </ac:spMkLst>
+        </pc:spChg>
+        <pc:picChg chg="add mod ord">
+          <ac:chgData name="Gurunag Sai Udaykumar" userId="44ad0e2733d7a09f" providerId="Windows Live" clId="Web-{18D27D60-2666-4E71-90C6-1D84DB9FAFF4}" dt="2022-03-27T18:06:33.757" v="60" actId="1076"/>
+          <ac:picMkLst>
+            <pc:docMk/>
+            <pc:sldMk cId="4093855891" sldId="261"/>
+            <ac:picMk id="4" creationId="{A8A04E93-F2C4-B83B-B544-2EB0DF5FE4B6}"/>
+          </ac:picMkLst>
+        </pc:picChg>
+        <pc:picChg chg="add mod">
+          <ac:chgData name="Gurunag Sai Udaykumar" userId="44ad0e2733d7a09f" providerId="Windows Live" clId="Web-{18D27D60-2666-4E71-90C6-1D84DB9FAFF4}" dt="2022-03-27T18:05:17.801" v="41" actId="1076"/>
+          <ac:picMkLst>
+            <pc:docMk/>
+            <pc:sldMk cId="4093855891" sldId="261"/>
+            <ac:picMk id="5" creationId="{5BDEA23D-64B7-1103-6956-94F3639428DE}"/>
+          </ac:picMkLst>
+        </pc:picChg>
+      </pc:sldChg>
+      <pc:sldChg chg="addSp delSp modSp add replId">
+        <pc:chgData name="Gurunag Sai Udaykumar" userId="44ad0e2733d7a09f" providerId="Windows Live" clId="Web-{18D27D60-2666-4E71-90C6-1D84DB9FAFF4}" dt="2022-03-27T19:47:46.449" v="379" actId="1076"/>
+        <pc:sldMkLst>
+          <pc:docMk/>
+          <pc:sldMk cId="3799002101" sldId="266"/>
+        </pc:sldMkLst>
+        <pc:spChg chg="mod">
+          <ac:chgData name="Gurunag Sai Udaykumar" userId="44ad0e2733d7a09f" providerId="Windows Live" clId="Web-{18D27D60-2666-4E71-90C6-1D84DB9FAFF4}" dt="2022-03-27T18:04:37.347" v="22" actId="20577"/>
+          <ac:spMkLst>
+            <pc:docMk/>
+            <pc:sldMk cId="3799002101" sldId="266"/>
+            <ac:spMk id="2" creationId="{1138663A-ADA1-EC99-08C6-7CD74C34AC8C}"/>
+          </ac:spMkLst>
+        </pc:spChg>
+        <pc:spChg chg="add del mod">
+          <ac:chgData name="Gurunag Sai Udaykumar" userId="44ad0e2733d7a09f" providerId="Windows Live" clId="Web-{18D27D60-2666-4E71-90C6-1D84DB9FAFF4}" dt="2022-03-27T19:45:00.227" v="249"/>
+          <ac:spMkLst>
+            <pc:docMk/>
+            <pc:sldMk cId="3799002101" sldId="266"/>
+            <ac:spMk id="3" creationId="{30D47EBC-678C-FD48-877C-EABFC86C3860}"/>
+          </ac:spMkLst>
+        </pc:spChg>
+        <pc:spChg chg="add mod">
+          <ac:chgData name="Gurunag Sai Udaykumar" userId="44ad0e2733d7a09f" providerId="Windows Live" clId="Web-{18D27D60-2666-4E71-90C6-1D84DB9FAFF4}" dt="2022-03-27T19:47:46.449" v="379" actId="1076"/>
+          <ac:spMkLst>
+            <pc:docMk/>
+            <pc:sldMk cId="3799002101" sldId="266"/>
+            <ac:spMk id="4" creationId="{B7618491-B313-B0DD-F224-24E076DB32B7}"/>
+          </ac:spMkLst>
+        </pc:spChg>
+        <pc:spChg chg="add mod">
+          <ac:chgData name="Gurunag Sai Udaykumar" userId="44ad0e2733d7a09f" providerId="Windows Live" clId="Web-{18D27D60-2666-4E71-90C6-1D84DB9FAFF4}" dt="2022-03-27T19:46:16.510" v="315" actId="20577"/>
+          <ac:spMkLst>
+            <pc:docMk/>
+            <pc:sldMk cId="3799002101" sldId="266"/>
+            <ac:spMk id="5" creationId="{9D7E1579-2D5A-2170-59A9-A2565BA9E444}"/>
+          </ac:spMkLst>
+        </pc:spChg>
+        <pc:spChg chg="add del mod">
+          <ac:chgData name="Gurunag Sai Udaykumar" userId="44ad0e2733d7a09f" providerId="Windows Live" clId="Web-{18D27D60-2666-4E71-90C6-1D84DB9FAFF4}" dt="2022-03-27T18:04:39.347" v="24"/>
+          <ac:spMkLst>
+            <pc:docMk/>
+            <pc:sldMk cId="3799002101" sldId="266"/>
+            <ac:spMk id="6" creationId="{B0C34579-60E6-A5E8-D4CC-37D971A06051}"/>
+          </ac:spMkLst>
+        </pc:spChg>
+        <pc:picChg chg="del">
+          <ac:chgData name="Gurunag Sai Udaykumar" userId="44ad0e2733d7a09f" providerId="Windows Live" clId="Web-{18D27D60-2666-4E71-90C6-1D84DB9FAFF4}" dt="2022-03-27T18:04:38.565" v="23"/>
+          <ac:picMkLst>
+            <pc:docMk/>
+            <pc:sldMk cId="3799002101" sldId="266"/>
+            <ac:picMk id="4" creationId="{A8A04E93-F2C4-B83B-B544-2EB0DF5FE4B6}"/>
+          </ac:picMkLst>
+        </pc:picChg>
+        <pc:picChg chg="del">
+          <ac:chgData name="Gurunag Sai Udaykumar" userId="44ad0e2733d7a09f" providerId="Windows Live" clId="Web-{18D27D60-2666-4E71-90C6-1D84DB9FAFF4}" dt="2022-03-27T18:04:48.550" v="28"/>
+          <ac:picMkLst>
+            <pc:docMk/>
+            <pc:sldMk cId="3799002101" sldId="266"/>
+            <ac:picMk id="5" creationId="{5BDEA23D-64B7-1103-6956-94F3639428DE}"/>
+          </ac:picMkLst>
+        </pc:picChg>
+        <pc:picChg chg="add mod ord">
+          <ac:chgData name="Gurunag Sai Udaykumar" userId="44ad0e2733d7a09f" providerId="Windows Live" clId="Web-{18D27D60-2666-4E71-90C6-1D84DB9FAFF4}" dt="2022-03-27T18:04:43.909" v="27" actId="1076"/>
+          <ac:picMkLst>
+            <pc:docMk/>
+            <pc:sldMk cId="3799002101" sldId="266"/>
+            <ac:picMk id="7" creationId="{9FEE3AFE-C581-E5A8-8696-5A41B08B9771}"/>
+          </ac:picMkLst>
+        </pc:picChg>
+        <pc:picChg chg="add mod">
+          <ac:chgData name="Gurunag Sai Udaykumar" userId="44ad0e2733d7a09f" providerId="Windows Live" clId="Web-{18D27D60-2666-4E71-90C6-1D84DB9FAFF4}" dt="2022-03-27T18:04:57.113" v="32" actId="1076"/>
+          <ac:picMkLst>
+            <pc:docMk/>
+            <pc:sldMk cId="3799002101" sldId="266"/>
+            <ac:picMk id="8" creationId="{7AE0B7AD-7F94-A1B0-F5AB-481818AAFA5C}"/>
+          </ac:picMkLst>
+        </pc:picChg>
+      </pc:sldChg>
+      <pc:sldChg chg="addSp delSp modSp add replId">
+        <pc:chgData name="Gurunag Sai Udaykumar" userId="44ad0e2733d7a09f" providerId="Windows Live" clId="Web-{18D27D60-2666-4E71-90C6-1D84DB9FAFF4}" dt="2022-03-27T21:23:46.809" v="491" actId="1076"/>
+        <pc:sldMkLst>
+          <pc:docMk/>
+          <pc:sldMk cId="1666512802" sldId="267"/>
+        </pc:sldMkLst>
+        <pc:spChg chg="mod">
+          <ac:chgData name="Gurunag Sai Udaykumar" userId="44ad0e2733d7a09f" providerId="Windows Live" clId="Web-{18D27D60-2666-4E71-90C6-1D84DB9FAFF4}" dt="2022-03-27T18:05:26.176" v="43" actId="20577"/>
+          <ac:spMkLst>
+            <pc:docMk/>
+            <pc:sldMk cId="1666512802" sldId="267"/>
+            <ac:spMk id="2" creationId="{1138663A-ADA1-EC99-08C6-7CD74C34AC8C}"/>
+          </ac:spMkLst>
+        </pc:spChg>
+        <pc:spChg chg="add del">
+          <ac:chgData name="Gurunag Sai Udaykumar" userId="44ad0e2733d7a09f" providerId="Windows Live" clId="Web-{18D27D60-2666-4E71-90C6-1D84DB9FAFF4}" dt="2022-03-27T19:48:02.574" v="383"/>
+          <ac:spMkLst>
+            <pc:docMk/>
+            <pc:sldMk cId="1666512802" sldId="267"/>
+            <ac:spMk id="3" creationId="{2FEC0C33-5E75-3902-ADE0-DFFB46A0A6FB}"/>
+          </ac:spMkLst>
+        </pc:spChg>
+        <pc:spChg chg="add del mod">
+          <ac:chgData name="Gurunag Sai Udaykumar" userId="44ad0e2733d7a09f" providerId="Windows Live" clId="Web-{18D27D60-2666-4E71-90C6-1D84DB9FAFF4}" dt="2022-03-27T18:05:40.427" v="46"/>
+          <ac:spMkLst>
+            <pc:docMk/>
+            <pc:sldMk cId="1666512802" sldId="267"/>
+            <ac:spMk id="4" creationId="{C3E7969C-76DB-AF15-4CAE-9F61956CCA9F}"/>
+          </ac:spMkLst>
+        </pc:spChg>
+        <pc:spChg chg="add del">
+          <ac:chgData name="Gurunag Sai Udaykumar" userId="44ad0e2733d7a09f" providerId="Windows Live" clId="Web-{18D27D60-2666-4E71-90C6-1D84DB9FAFF4}" dt="2022-03-27T19:48:00.793" v="382"/>
+          <ac:spMkLst>
+            <pc:docMk/>
+            <pc:sldMk cId="1666512802" sldId="267"/>
+            <ac:spMk id="4" creationId="{C928987A-8EB8-3ADD-0795-A98D92967417}"/>
+          </ac:spMkLst>
+        </pc:spChg>
+        <pc:spChg chg="add mod">
+          <ac:chgData name="Gurunag Sai Udaykumar" userId="44ad0e2733d7a09f" providerId="Windows Live" clId="Web-{18D27D60-2666-4E71-90C6-1D84DB9FAFF4}" dt="2022-03-27T19:49:58.560" v="487" actId="20577"/>
+          <ac:spMkLst>
+            <pc:docMk/>
+            <pc:sldMk cId="1666512802" sldId="267"/>
+            <ac:spMk id="6" creationId="{859F8F08-4666-77CE-6CA3-E446137178C1}"/>
+          </ac:spMkLst>
+        </pc:spChg>
+        <pc:picChg chg="add mod">
+          <ac:chgData name="Gurunag Sai Udaykumar" userId="44ad0e2733d7a09f" providerId="Windows Live" clId="Web-{18D27D60-2666-4E71-90C6-1D84DB9FAFF4}" dt="2022-03-27T21:23:46.809" v="491" actId="1076"/>
+          <ac:picMkLst>
+            <pc:docMk/>
+            <pc:sldMk cId="1666512802" sldId="267"/>
+            <ac:picMk id="3" creationId="{FDEB4A1A-99AC-BB24-61DC-75E0664B8784}"/>
+          </ac:picMkLst>
+        </pc:picChg>
+        <pc:picChg chg="add mod ord">
+          <ac:chgData name="Gurunag Sai Udaykumar" userId="44ad0e2733d7a09f" providerId="Windows Live" clId="Web-{18D27D60-2666-4E71-90C6-1D84DB9FAFF4}" dt="2022-03-27T18:05:44.896" v="50" actId="1076"/>
+          <ac:picMkLst>
+            <pc:docMk/>
+            <pc:sldMk cId="1666512802" sldId="267"/>
+            <ac:picMk id="5" creationId="{EDE93E30-A686-1B44-E514-1AEC2CED8D65}"/>
+          </ac:picMkLst>
+        </pc:picChg>
+        <pc:picChg chg="del">
+          <ac:chgData name="Gurunag Sai Udaykumar" userId="44ad0e2733d7a09f" providerId="Windows Live" clId="Web-{18D27D60-2666-4E71-90C6-1D84DB9FAFF4}" dt="2022-03-27T18:05:39.505" v="45"/>
+          <ac:picMkLst>
+            <pc:docMk/>
+            <pc:sldMk cId="1666512802" sldId="267"/>
+            <ac:picMk id="7" creationId="{9FEE3AFE-C581-E5A8-8696-5A41B08B9771}"/>
+          </ac:picMkLst>
+        </pc:picChg>
+        <pc:picChg chg="del">
+          <ac:chgData name="Gurunag Sai Udaykumar" userId="44ad0e2733d7a09f" providerId="Windows Live" clId="Web-{18D27D60-2666-4E71-90C6-1D84DB9FAFF4}" dt="2022-03-27T18:05:27.692" v="44"/>
+          <ac:picMkLst>
+            <pc:docMk/>
+            <pc:sldMk cId="1666512802" sldId="267"/>
+            <ac:picMk id="8" creationId="{7AE0B7AD-7F94-A1B0-F5AB-481818AAFA5C}"/>
+          </ac:picMkLst>
+        </pc:picChg>
+      </pc:sldChg>
+      <pc:sldChg chg="addSp delSp modSp new">
+        <pc:chgData name="Gurunag Sai Udaykumar" userId="44ad0e2733d7a09f" providerId="Windows Live" clId="Web-{18D27D60-2666-4E71-90C6-1D84DB9FAFF4}" dt="2022-03-27T21:25:47.437" v="535" actId="20577"/>
+        <pc:sldMkLst>
+          <pc:docMk/>
+          <pc:sldMk cId="3123228274" sldId="268"/>
+        </pc:sldMkLst>
+        <pc:spChg chg="mod">
+          <ac:chgData name="Gurunag Sai Udaykumar" userId="44ad0e2733d7a09f" providerId="Windows Live" clId="Web-{18D27D60-2666-4E71-90C6-1D84DB9FAFF4}" dt="2022-03-27T21:24:14.372" v="508" actId="20577"/>
+          <ac:spMkLst>
+            <pc:docMk/>
+            <pc:sldMk cId="3123228274" sldId="268"/>
+            <ac:spMk id="2" creationId="{78BA4EF3-C558-9822-8771-625171B55968}"/>
+          </ac:spMkLst>
+        </pc:spChg>
+        <pc:spChg chg="del">
+          <ac:chgData name="Gurunag Sai Udaykumar" userId="44ad0e2733d7a09f" providerId="Windows Live" clId="Web-{18D27D60-2666-4E71-90C6-1D84DB9FAFF4}" dt="2022-03-27T21:24:48.529" v="509"/>
+          <ac:spMkLst>
+            <pc:docMk/>
+            <pc:sldMk cId="3123228274" sldId="268"/>
+            <ac:spMk id="3" creationId="{2D69646F-3A35-4D67-B0FB-56DF5953F72C}"/>
+          </ac:spMkLst>
+        </pc:spChg>
+        <pc:spChg chg="add mod">
+          <ac:chgData name="Gurunag Sai Udaykumar" userId="44ad0e2733d7a09f" providerId="Windows Live" clId="Web-{18D27D60-2666-4E71-90C6-1D84DB9FAFF4}" dt="2022-03-27T21:25:30.046" v="525" actId="20577"/>
+          <ac:spMkLst>
+            <pc:docMk/>
+            <pc:sldMk cId="3123228274" sldId="268"/>
+            <ac:spMk id="6" creationId="{FC41849A-C648-FD1D-1E3B-E80AC4442C10}"/>
+          </ac:spMkLst>
+        </pc:spChg>
+        <pc:spChg chg="add mod">
+          <ac:chgData name="Gurunag Sai Udaykumar" userId="44ad0e2733d7a09f" providerId="Windows Live" clId="Web-{18D27D60-2666-4E71-90C6-1D84DB9FAFF4}" dt="2022-03-27T21:25:47.437" v="535" actId="20577"/>
+          <ac:spMkLst>
+            <pc:docMk/>
+            <pc:sldMk cId="3123228274" sldId="268"/>
+            <ac:spMk id="7" creationId="{A11EFBEB-7ACB-9315-94F8-53E8BD774542}"/>
+          </ac:spMkLst>
+        </pc:spChg>
+        <pc:picChg chg="add mod ord">
+          <ac:chgData name="Gurunag Sai Udaykumar" userId="44ad0e2733d7a09f" providerId="Windows Live" clId="Web-{18D27D60-2666-4E71-90C6-1D84DB9FAFF4}" dt="2022-03-27T21:24:51.826" v="510" actId="1076"/>
+          <ac:picMkLst>
+            <pc:docMk/>
+            <pc:sldMk cId="3123228274" sldId="268"/>
+            <ac:picMk id="4" creationId="{A1FE3802-E3FA-52F3-9C79-3B5D8C7D6A80}"/>
+          </ac:picMkLst>
+        </pc:picChg>
+        <pc:picChg chg="add mod">
+          <ac:chgData name="Gurunag Sai Udaykumar" userId="44ad0e2733d7a09f" providerId="Windows Live" clId="Web-{18D27D60-2666-4E71-90C6-1D84DB9FAFF4}" dt="2022-03-27T21:25:09.498" v="514" actId="1076"/>
+          <ac:picMkLst>
+            <pc:docMk/>
+            <pc:sldMk cId="3123228274" sldId="268"/>
+            <ac:picMk id="5" creationId="{C2A7B4D4-AB4D-93B2-B4AE-D20EA07BF57A}"/>
+          </ac:picMkLst>
+        </pc:picChg>
+      </pc:sldChg>
+      <pc:sldChg chg="new del">
+        <pc:chgData name="Gurunag Sai Udaykumar" userId="44ad0e2733d7a09f" providerId="Windows Live" clId="Web-{18D27D60-2666-4E71-90C6-1D84DB9FAFF4}" dt="2022-03-27T21:25:34.514" v="527"/>
+        <pc:sldMkLst>
+          <pc:docMk/>
+          <pc:sldMk cId="4155315770" sldId="269"/>
+        </pc:sldMkLst>
+      </pc:sldChg>
+    </pc:docChg>
+  </pc:docChgLst>
+  <pc:docChgLst>
     <pc:chgData name="Gurunag Sai Udaykumar" userId="44ad0e2733d7a09f" providerId="Windows Live" clId="Web-{F5A963E6-B2CA-48B2-AD67-A53AECD50108}"/>
     <pc:docChg chg="modSld">
       <pc:chgData name="Gurunag Sai Udaykumar" userId="44ad0e2733d7a09f" providerId="Windows Live" clId="Web-{F5A963E6-B2CA-48B2-AD67-A53AECD50108}" dt="2022-03-28T10:35:52.777" v="41" actId="20577"/>
@@ -2153,345 +2492,6 @@
             <ac:spMk id="5" creationId="{1C23A928-92A0-7FD7-E6AE-ACBE3318E767}"/>
           </ac:spMkLst>
         </pc:spChg>
-      </pc:sldChg>
-    </pc:docChg>
-  </pc:docChgLst>
-  <pc:docChgLst>
-    <pc:chgData name="Gurunag Sai Udaykumar" userId="44ad0e2733d7a09f" providerId="Windows Live" clId="Web-{18D27D60-2666-4E71-90C6-1D84DB9FAFF4}"/>
-    <pc:docChg chg="addSld delSld modSld">
-      <pc:chgData name="Gurunag Sai Udaykumar" userId="44ad0e2733d7a09f" providerId="Windows Live" clId="Web-{18D27D60-2666-4E71-90C6-1D84DB9FAFF4}" dt="2022-03-27T21:25:47.437" v="535" actId="20577"/>
-      <pc:docMkLst>
-        <pc:docMk/>
-      </pc:docMkLst>
-      <pc:sldChg chg="addSp delSp modSp">
-        <pc:chgData name="Gurunag Sai Udaykumar" userId="44ad0e2733d7a09f" providerId="Windows Live" clId="Web-{18D27D60-2666-4E71-90C6-1D84DB9FAFF4}" dt="2022-03-27T19:44:46.836" v="245" actId="1076"/>
-        <pc:sldMkLst>
-          <pc:docMk/>
-          <pc:sldMk cId="1273893743" sldId="260"/>
-        </pc:sldMkLst>
-        <pc:spChg chg="del">
-          <ac:chgData name="Gurunag Sai Udaykumar" userId="44ad0e2733d7a09f" providerId="Windows Live" clId="Web-{18D27D60-2666-4E71-90C6-1D84DB9FAFF4}" dt="2022-03-27T18:02:07.513" v="0"/>
-          <ac:spMkLst>
-            <pc:docMk/>
-            <pc:sldMk cId="1273893743" sldId="260"/>
-            <ac:spMk id="3" creationId="{AA989D50-C831-850F-6E29-BE1FCF9A18B4}"/>
-          </ac:spMkLst>
-        </pc:spChg>
-        <pc:spChg chg="add del">
-          <ac:chgData name="Gurunag Sai Udaykumar" userId="44ad0e2733d7a09f" providerId="Windows Live" clId="Web-{18D27D60-2666-4E71-90C6-1D84DB9FAFF4}" dt="2022-03-27T19:43:30.710" v="181"/>
-          <ac:spMkLst>
-            <pc:docMk/>
-            <pc:sldMk cId="1273893743" sldId="260"/>
-            <ac:spMk id="3" creationId="{ECF1FC14-1319-1DAA-1807-4961FB44D50D}"/>
-          </ac:spMkLst>
-        </pc:spChg>
-        <pc:spChg chg="add mod">
-          <ac:chgData name="Gurunag Sai Udaykumar" userId="44ad0e2733d7a09f" providerId="Windows Live" clId="Web-{18D27D60-2666-4E71-90C6-1D84DB9FAFF4}" dt="2022-03-27T19:44:15.305" v="222" actId="20577"/>
-          <ac:spMkLst>
-            <pc:docMk/>
-            <pc:sldMk cId="1273893743" sldId="260"/>
-            <ac:spMk id="5" creationId="{896E1F6E-D38F-0498-60A8-AC54500B0507}"/>
-          </ac:spMkLst>
-        </pc:spChg>
-        <pc:spChg chg="add mod">
-          <ac:chgData name="Gurunag Sai Udaykumar" userId="44ad0e2733d7a09f" providerId="Windows Live" clId="Web-{18D27D60-2666-4E71-90C6-1D84DB9FAFF4}" dt="2022-03-27T19:44:46.836" v="245" actId="1076"/>
-          <ac:spMkLst>
-            <pc:docMk/>
-            <pc:sldMk cId="1273893743" sldId="260"/>
-            <ac:spMk id="6" creationId="{5045DC78-609F-230B-0816-79878D03D32A}"/>
-          </ac:spMkLst>
-        </pc:spChg>
-        <pc:picChg chg="add mod ord">
-          <ac:chgData name="Gurunag Sai Udaykumar" userId="44ad0e2733d7a09f" providerId="Windows Live" clId="Web-{18D27D60-2666-4E71-90C6-1D84DB9FAFF4}" dt="2022-03-27T18:02:13.279" v="2" actId="1076"/>
-          <ac:picMkLst>
-            <pc:docMk/>
-            <pc:sldMk cId="1273893743" sldId="260"/>
-            <ac:picMk id="4" creationId="{D8806051-B72E-B2FB-1165-831640EE721F}"/>
-          </ac:picMkLst>
-        </pc:picChg>
-      </pc:sldChg>
-      <pc:sldChg chg="addSp delSp modSp">
-        <pc:chgData name="Gurunag Sai Udaykumar" userId="44ad0e2733d7a09f" providerId="Windows Live" clId="Web-{18D27D60-2666-4E71-90C6-1D84DB9FAFF4}" dt="2022-03-27T19:47:24.464" v="370" actId="20577"/>
-        <pc:sldMkLst>
-          <pc:docMk/>
-          <pc:sldMk cId="4093855891" sldId="261"/>
-        </pc:sldMkLst>
-        <pc:spChg chg="mod">
-          <ac:chgData name="Gurunag Sai Udaykumar" userId="44ad0e2733d7a09f" providerId="Windows Live" clId="Web-{18D27D60-2666-4E71-90C6-1D84DB9FAFF4}" dt="2022-03-27T18:03:23.360" v="6" actId="20577"/>
-          <ac:spMkLst>
-            <pc:docMk/>
-            <pc:sldMk cId="4093855891" sldId="261"/>
-            <ac:spMk id="2" creationId="{1138663A-ADA1-EC99-08C6-7CD74C34AC8C}"/>
-          </ac:spMkLst>
-        </pc:spChg>
-        <pc:spChg chg="del">
-          <ac:chgData name="Gurunag Sai Udaykumar" userId="44ad0e2733d7a09f" providerId="Windows Live" clId="Web-{18D27D60-2666-4E71-90C6-1D84DB9FAFF4}" dt="2022-03-27T18:03:47.892" v="7"/>
-          <ac:spMkLst>
-            <pc:docMk/>
-            <pc:sldMk cId="4093855891" sldId="261"/>
-            <ac:spMk id="3" creationId="{2AD8E59A-601B-9713-314C-ABA9CC2BE482}"/>
-          </ac:spMkLst>
-        </pc:spChg>
-        <pc:spChg chg="add mod">
-          <ac:chgData name="Gurunag Sai Udaykumar" userId="44ad0e2733d7a09f" providerId="Windows Live" clId="Web-{18D27D60-2666-4E71-90C6-1D84DB9FAFF4}" dt="2022-03-27T19:46:24.307" v="318" actId="1076"/>
-          <ac:spMkLst>
-            <pc:docMk/>
-            <pc:sldMk cId="4093855891" sldId="261"/>
-            <ac:spMk id="3" creationId="{DEBEFA2A-A471-951C-F22C-AFCED7C6AF7C}"/>
-          </ac:spMkLst>
-        </pc:spChg>
-        <pc:spChg chg="add del mod">
-          <ac:chgData name="Gurunag Sai Udaykumar" userId="44ad0e2733d7a09f" providerId="Windows Live" clId="Web-{18D27D60-2666-4E71-90C6-1D84DB9FAFF4}" dt="2022-03-27T18:06:01.584" v="55"/>
-          <ac:spMkLst>
-            <pc:docMk/>
-            <pc:sldMk cId="4093855891" sldId="261"/>
-            <ac:spMk id="6" creationId="{342BEFC5-BD1D-D428-2C4B-F26677226015}"/>
-          </ac:spMkLst>
-        </pc:spChg>
-        <pc:spChg chg="add mod">
-          <ac:chgData name="Gurunag Sai Udaykumar" userId="44ad0e2733d7a09f" providerId="Windows Live" clId="Web-{18D27D60-2666-4E71-90C6-1D84DB9FAFF4}" dt="2022-03-27T19:47:24.464" v="370" actId="20577"/>
-          <ac:spMkLst>
-            <pc:docMk/>
-            <pc:sldMk cId="4093855891" sldId="261"/>
-            <ac:spMk id="7" creationId="{8916C0EA-1B25-5194-7767-2C44D67D8916}"/>
-          </ac:spMkLst>
-        </pc:spChg>
-        <pc:picChg chg="add mod ord">
-          <ac:chgData name="Gurunag Sai Udaykumar" userId="44ad0e2733d7a09f" providerId="Windows Live" clId="Web-{18D27D60-2666-4E71-90C6-1D84DB9FAFF4}" dt="2022-03-27T18:06:33.757" v="60" actId="1076"/>
-          <ac:picMkLst>
-            <pc:docMk/>
-            <pc:sldMk cId="4093855891" sldId="261"/>
-            <ac:picMk id="4" creationId="{A8A04E93-F2C4-B83B-B544-2EB0DF5FE4B6}"/>
-          </ac:picMkLst>
-        </pc:picChg>
-        <pc:picChg chg="add mod">
-          <ac:chgData name="Gurunag Sai Udaykumar" userId="44ad0e2733d7a09f" providerId="Windows Live" clId="Web-{18D27D60-2666-4E71-90C6-1D84DB9FAFF4}" dt="2022-03-27T18:05:17.801" v="41" actId="1076"/>
-          <ac:picMkLst>
-            <pc:docMk/>
-            <pc:sldMk cId="4093855891" sldId="261"/>
-            <ac:picMk id="5" creationId="{5BDEA23D-64B7-1103-6956-94F3639428DE}"/>
-          </ac:picMkLst>
-        </pc:picChg>
-      </pc:sldChg>
-      <pc:sldChg chg="addSp delSp modSp add replId">
-        <pc:chgData name="Gurunag Sai Udaykumar" userId="44ad0e2733d7a09f" providerId="Windows Live" clId="Web-{18D27D60-2666-4E71-90C6-1D84DB9FAFF4}" dt="2022-03-27T19:47:46.449" v="379" actId="1076"/>
-        <pc:sldMkLst>
-          <pc:docMk/>
-          <pc:sldMk cId="3799002101" sldId="266"/>
-        </pc:sldMkLst>
-        <pc:spChg chg="mod">
-          <ac:chgData name="Gurunag Sai Udaykumar" userId="44ad0e2733d7a09f" providerId="Windows Live" clId="Web-{18D27D60-2666-4E71-90C6-1D84DB9FAFF4}" dt="2022-03-27T18:04:37.347" v="22" actId="20577"/>
-          <ac:spMkLst>
-            <pc:docMk/>
-            <pc:sldMk cId="3799002101" sldId="266"/>
-            <ac:spMk id="2" creationId="{1138663A-ADA1-EC99-08C6-7CD74C34AC8C}"/>
-          </ac:spMkLst>
-        </pc:spChg>
-        <pc:spChg chg="add del mod">
-          <ac:chgData name="Gurunag Sai Udaykumar" userId="44ad0e2733d7a09f" providerId="Windows Live" clId="Web-{18D27D60-2666-4E71-90C6-1D84DB9FAFF4}" dt="2022-03-27T19:45:00.227" v="249"/>
-          <ac:spMkLst>
-            <pc:docMk/>
-            <pc:sldMk cId="3799002101" sldId="266"/>
-            <ac:spMk id="3" creationId="{30D47EBC-678C-FD48-877C-EABFC86C3860}"/>
-          </ac:spMkLst>
-        </pc:spChg>
-        <pc:spChg chg="add mod">
-          <ac:chgData name="Gurunag Sai Udaykumar" userId="44ad0e2733d7a09f" providerId="Windows Live" clId="Web-{18D27D60-2666-4E71-90C6-1D84DB9FAFF4}" dt="2022-03-27T19:47:46.449" v="379" actId="1076"/>
-          <ac:spMkLst>
-            <pc:docMk/>
-            <pc:sldMk cId="3799002101" sldId="266"/>
-            <ac:spMk id="4" creationId="{B7618491-B313-B0DD-F224-24E076DB32B7}"/>
-          </ac:spMkLst>
-        </pc:spChg>
-        <pc:spChg chg="add mod">
-          <ac:chgData name="Gurunag Sai Udaykumar" userId="44ad0e2733d7a09f" providerId="Windows Live" clId="Web-{18D27D60-2666-4E71-90C6-1D84DB9FAFF4}" dt="2022-03-27T19:46:16.510" v="315" actId="20577"/>
-          <ac:spMkLst>
-            <pc:docMk/>
-            <pc:sldMk cId="3799002101" sldId="266"/>
-            <ac:spMk id="5" creationId="{9D7E1579-2D5A-2170-59A9-A2565BA9E444}"/>
-          </ac:spMkLst>
-        </pc:spChg>
-        <pc:spChg chg="add del mod">
-          <ac:chgData name="Gurunag Sai Udaykumar" userId="44ad0e2733d7a09f" providerId="Windows Live" clId="Web-{18D27D60-2666-4E71-90C6-1D84DB9FAFF4}" dt="2022-03-27T18:04:39.347" v="24"/>
-          <ac:spMkLst>
-            <pc:docMk/>
-            <pc:sldMk cId="3799002101" sldId="266"/>
-            <ac:spMk id="6" creationId="{B0C34579-60E6-A5E8-D4CC-37D971A06051}"/>
-          </ac:spMkLst>
-        </pc:spChg>
-        <pc:picChg chg="del">
-          <ac:chgData name="Gurunag Sai Udaykumar" userId="44ad0e2733d7a09f" providerId="Windows Live" clId="Web-{18D27D60-2666-4E71-90C6-1D84DB9FAFF4}" dt="2022-03-27T18:04:38.565" v="23"/>
-          <ac:picMkLst>
-            <pc:docMk/>
-            <pc:sldMk cId="3799002101" sldId="266"/>
-            <ac:picMk id="4" creationId="{A8A04E93-F2C4-B83B-B544-2EB0DF5FE4B6}"/>
-          </ac:picMkLst>
-        </pc:picChg>
-        <pc:picChg chg="del">
-          <ac:chgData name="Gurunag Sai Udaykumar" userId="44ad0e2733d7a09f" providerId="Windows Live" clId="Web-{18D27D60-2666-4E71-90C6-1D84DB9FAFF4}" dt="2022-03-27T18:04:48.550" v="28"/>
-          <ac:picMkLst>
-            <pc:docMk/>
-            <pc:sldMk cId="3799002101" sldId="266"/>
-            <ac:picMk id="5" creationId="{5BDEA23D-64B7-1103-6956-94F3639428DE}"/>
-          </ac:picMkLst>
-        </pc:picChg>
-        <pc:picChg chg="add mod ord">
-          <ac:chgData name="Gurunag Sai Udaykumar" userId="44ad0e2733d7a09f" providerId="Windows Live" clId="Web-{18D27D60-2666-4E71-90C6-1D84DB9FAFF4}" dt="2022-03-27T18:04:43.909" v="27" actId="1076"/>
-          <ac:picMkLst>
-            <pc:docMk/>
-            <pc:sldMk cId="3799002101" sldId="266"/>
-            <ac:picMk id="7" creationId="{9FEE3AFE-C581-E5A8-8696-5A41B08B9771}"/>
-          </ac:picMkLst>
-        </pc:picChg>
-        <pc:picChg chg="add mod">
-          <ac:chgData name="Gurunag Sai Udaykumar" userId="44ad0e2733d7a09f" providerId="Windows Live" clId="Web-{18D27D60-2666-4E71-90C6-1D84DB9FAFF4}" dt="2022-03-27T18:04:57.113" v="32" actId="1076"/>
-          <ac:picMkLst>
-            <pc:docMk/>
-            <pc:sldMk cId="3799002101" sldId="266"/>
-            <ac:picMk id="8" creationId="{7AE0B7AD-7F94-A1B0-F5AB-481818AAFA5C}"/>
-          </ac:picMkLst>
-        </pc:picChg>
-      </pc:sldChg>
-      <pc:sldChg chg="addSp delSp modSp add replId">
-        <pc:chgData name="Gurunag Sai Udaykumar" userId="44ad0e2733d7a09f" providerId="Windows Live" clId="Web-{18D27D60-2666-4E71-90C6-1D84DB9FAFF4}" dt="2022-03-27T21:23:46.809" v="491" actId="1076"/>
-        <pc:sldMkLst>
-          <pc:docMk/>
-          <pc:sldMk cId="1666512802" sldId="267"/>
-        </pc:sldMkLst>
-        <pc:spChg chg="mod">
-          <ac:chgData name="Gurunag Sai Udaykumar" userId="44ad0e2733d7a09f" providerId="Windows Live" clId="Web-{18D27D60-2666-4E71-90C6-1D84DB9FAFF4}" dt="2022-03-27T18:05:26.176" v="43" actId="20577"/>
-          <ac:spMkLst>
-            <pc:docMk/>
-            <pc:sldMk cId="1666512802" sldId="267"/>
-            <ac:spMk id="2" creationId="{1138663A-ADA1-EC99-08C6-7CD74C34AC8C}"/>
-          </ac:spMkLst>
-        </pc:spChg>
-        <pc:spChg chg="add del">
-          <ac:chgData name="Gurunag Sai Udaykumar" userId="44ad0e2733d7a09f" providerId="Windows Live" clId="Web-{18D27D60-2666-4E71-90C6-1D84DB9FAFF4}" dt="2022-03-27T19:48:02.574" v="383"/>
-          <ac:spMkLst>
-            <pc:docMk/>
-            <pc:sldMk cId="1666512802" sldId="267"/>
-            <ac:spMk id="3" creationId="{2FEC0C33-5E75-3902-ADE0-DFFB46A0A6FB}"/>
-          </ac:spMkLst>
-        </pc:spChg>
-        <pc:spChg chg="add del mod">
-          <ac:chgData name="Gurunag Sai Udaykumar" userId="44ad0e2733d7a09f" providerId="Windows Live" clId="Web-{18D27D60-2666-4E71-90C6-1D84DB9FAFF4}" dt="2022-03-27T18:05:40.427" v="46"/>
-          <ac:spMkLst>
-            <pc:docMk/>
-            <pc:sldMk cId="1666512802" sldId="267"/>
-            <ac:spMk id="4" creationId="{C3E7969C-76DB-AF15-4CAE-9F61956CCA9F}"/>
-          </ac:spMkLst>
-        </pc:spChg>
-        <pc:spChg chg="add del">
-          <ac:chgData name="Gurunag Sai Udaykumar" userId="44ad0e2733d7a09f" providerId="Windows Live" clId="Web-{18D27D60-2666-4E71-90C6-1D84DB9FAFF4}" dt="2022-03-27T19:48:00.793" v="382"/>
-          <ac:spMkLst>
-            <pc:docMk/>
-            <pc:sldMk cId="1666512802" sldId="267"/>
-            <ac:spMk id="4" creationId="{C928987A-8EB8-3ADD-0795-A98D92967417}"/>
-          </ac:spMkLst>
-        </pc:spChg>
-        <pc:spChg chg="add mod">
-          <ac:chgData name="Gurunag Sai Udaykumar" userId="44ad0e2733d7a09f" providerId="Windows Live" clId="Web-{18D27D60-2666-4E71-90C6-1D84DB9FAFF4}" dt="2022-03-27T19:49:58.560" v="487" actId="20577"/>
-          <ac:spMkLst>
-            <pc:docMk/>
-            <pc:sldMk cId="1666512802" sldId="267"/>
-            <ac:spMk id="6" creationId="{859F8F08-4666-77CE-6CA3-E446137178C1}"/>
-          </ac:spMkLst>
-        </pc:spChg>
-        <pc:picChg chg="add mod">
-          <ac:chgData name="Gurunag Sai Udaykumar" userId="44ad0e2733d7a09f" providerId="Windows Live" clId="Web-{18D27D60-2666-4E71-90C6-1D84DB9FAFF4}" dt="2022-03-27T21:23:46.809" v="491" actId="1076"/>
-          <ac:picMkLst>
-            <pc:docMk/>
-            <pc:sldMk cId="1666512802" sldId="267"/>
-            <ac:picMk id="3" creationId="{FDEB4A1A-99AC-BB24-61DC-75E0664B8784}"/>
-          </ac:picMkLst>
-        </pc:picChg>
-        <pc:picChg chg="add mod ord">
-          <ac:chgData name="Gurunag Sai Udaykumar" userId="44ad0e2733d7a09f" providerId="Windows Live" clId="Web-{18D27D60-2666-4E71-90C6-1D84DB9FAFF4}" dt="2022-03-27T18:05:44.896" v="50" actId="1076"/>
-          <ac:picMkLst>
-            <pc:docMk/>
-            <pc:sldMk cId="1666512802" sldId="267"/>
-            <ac:picMk id="5" creationId="{EDE93E30-A686-1B44-E514-1AEC2CED8D65}"/>
-          </ac:picMkLst>
-        </pc:picChg>
-        <pc:picChg chg="del">
-          <ac:chgData name="Gurunag Sai Udaykumar" userId="44ad0e2733d7a09f" providerId="Windows Live" clId="Web-{18D27D60-2666-4E71-90C6-1D84DB9FAFF4}" dt="2022-03-27T18:05:39.505" v="45"/>
-          <ac:picMkLst>
-            <pc:docMk/>
-            <pc:sldMk cId="1666512802" sldId="267"/>
-            <ac:picMk id="7" creationId="{9FEE3AFE-C581-E5A8-8696-5A41B08B9771}"/>
-          </ac:picMkLst>
-        </pc:picChg>
-        <pc:picChg chg="del">
-          <ac:chgData name="Gurunag Sai Udaykumar" userId="44ad0e2733d7a09f" providerId="Windows Live" clId="Web-{18D27D60-2666-4E71-90C6-1D84DB9FAFF4}" dt="2022-03-27T18:05:27.692" v="44"/>
-          <ac:picMkLst>
-            <pc:docMk/>
-            <pc:sldMk cId="1666512802" sldId="267"/>
-            <ac:picMk id="8" creationId="{7AE0B7AD-7F94-A1B0-F5AB-481818AAFA5C}"/>
-          </ac:picMkLst>
-        </pc:picChg>
-      </pc:sldChg>
-      <pc:sldChg chg="addSp delSp modSp new">
-        <pc:chgData name="Gurunag Sai Udaykumar" userId="44ad0e2733d7a09f" providerId="Windows Live" clId="Web-{18D27D60-2666-4E71-90C6-1D84DB9FAFF4}" dt="2022-03-27T21:25:47.437" v="535" actId="20577"/>
-        <pc:sldMkLst>
-          <pc:docMk/>
-          <pc:sldMk cId="3123228274" sldId="268"/>
-        </pc:sldMkLst>
-        <pc:spChg chg="mod">
-          <ac:chgData name="Gurunag Sai Udaykumar" userId="44ad0e2733d7a09f" providerId="Windows Live" clId="Web-{18D27D60-2666-4E71-90C6-1D84DB9FAFF4}" dt="2022-03-27T21:24:14.372" v="508" actId="20577"/>
-          <ac:spMkLst>
-            <pc:docMk/>
-            <pc:sldMk cId="3123228274" sldId="268"/>
-            <ac:spMk id="2" creationId="{78BA4EF3-C558-9822-8771-625171B55968}"/>
-          </ac:spMkLst>
-        </pc:spChg>
-        <pc:spChg chg="del">
-          <ac:chgData name="Gurunag Sai Udaykumar" userId="44ad0e2733d7a09f" providerId="Windows Live" clId="Web-{18D27D60-2666-4E71-90C6-1D84DB9FAFF4}" dt="2022-03-27T21:24:48.529" v="509"/>
-          <ac:spMkLst>
-            <pc:docMk/>
-            <pc:sldMk cId="3123228274" sldId="268"/>
-            <ac:spMk id="3" creationId="{2D69646F-3A35-4D67-B0FB-56DF5953F72C}"/>
-          </ac:spMkLst>
-        </pc:spChg>
-        <pc:spChg chg="add mod">
-          <ac:chgData name="Gurunag Sai Udaykumar" userId="44ad0e2733d7a09f" providerId="Windows Live" clId="Web-{18D27D60-2666-4E71-90C6-1D84DB9FAFF4}" dt="2022-03-27T21:25:30.046" v="525" actId="20577"/>
-          <ac:spMkLst>
-            <pc:docMk/>
-            <pc:sldMk cId="3123228274" sldId="268"/>
-            <ac:spMk id="6" creationId="{FC41849A-C648-FD1D-1E3B-E80AC4442C10}"/>
-          </ac:spMkLst>
-        </pc:spChg>
-        <pc:spChg chg="add mod">
-          <ac:chgData name="Gurunag Sai Udaykumar" userId="44ad0e2733d7a09f" providerId="Windows Live" clId="Web-{18D27D60-2666-4E71-90C6-1D84DB9FAFF4}" dt="2022-03-27T21:25:47.437" v="535" actId="20577"/>
-          <ac:spMkLst>
-            <pc:docMk/>
-            <pc:sldMk cId="3123228274" sldId="268"/>
-            <ac:spMk id="7" creationId="{A11EFBEB-7ACB-9315-94F8-53E8BD774542}"/>
-          </ac:spMkLst>
-        </pc:spChg>
-        <pc:picChg chg="add mod ord">
-          <ac:chgData name="Gurunag Sai Udaykumar" userId="44ad0e2733d7a09f" providerId="Windows Live" clId="Web-{18D27D60-2666-4E71-90C6-1D84DB9FAFF4}" dt="2022-03-27T21:24:51.826" v="510" actId="1076"/>
-          <ac:picMkLst>
-            <pc:docMk/>
-            <pc:sldMk cId="3123228274" sldId="268"/>
-            <ac:picMk id="4" creationId="{A1FE3802-E3FA-52F3-9C79-3B5D8C7D6A80}"/>
-          </ac:picMkLst>
-        </pc:picChg>
-        <pc:picChg chg="add mod">
-          <ac:chgData name="Gurunag Sai Udaykumar" userId="44ad0e2733d7a09f" providerId="Windows Live" clId="Web-{18D27D60-2666-4E71-90C6-1D84DB9FAFF4}" dt="2022-03-27T21:25:09.498" v="514" actId="1076"/>
-          <ac:picMkLst>
-            <pc:docMk/>
-            <pc:sldMk cId="3123228274" sldId="268"/>
-            <ac:picMk id="5" creationId="{C2A7B4D4-AB4D-93B2-B4AE-D20EA07BF57A}"/>
-          </ac:picMkLst>
-        </pc:picChg>
-      </pc:sldChg>
-      <pc:sldChg chg="new del">
-        <pc:chgData name="Gurunag Sai Udaykumar" userId="44ad0e2733d7a09f" providerId="Windows Live" clId="Web-{18D27D60-2666-4E71-90C6-1D84DB9FAFF4}" dt="2022-03-27T21:25:34.514" v="527"/>
-        <pc:sldMkLst>
-          <pc:docMk/>
-          <pc:sldMk cId="4155315770" sldId="269"/>
-        </pc:sldMkLst>
       </pc:sldChg>
     </pc:docChg>
   </pc:docChgLst>
@@ -3291,7 +3291,7 @@
             <a:fld id="{B61BEF0D-F0BB-DE4B-95CE-6DB70DBA9567}" type="datetimeFigureOut">
               <a:rPr lang="en-US" dirty="0"/>
               <a:pPr/>
-              <a:t>3/28/2022</a:t>
+              <a:t>3/29/2022</a:t>
             </a:fld>
             <a:endParaRPr lang="en-US" dirty="0"/>
           </a:p>
@@ -3543,7 +3543,7 @@
             <a:fld id="{B61BEF0D-F0BB-DE4B-95CE-6DB70DBA9567}" type="datetimeFigureOut">
               <a:rPr lang="en-US" dirty="0"/>
               <a:pPr/>
-              <a:t>3/28/2022</a:t>
+              <a:t>3/29/2022</a:t>
             </a:fld>
             <a:endParaRPr lang="en-US" dirty="0"/>
           </a:p>
@@ -3858,7 +3858,7 @@
             <a:fld id="{B61BEF0D-F0BB-DE4B-95CE-6DB70DBA9567}" type="datetimeFigureOut">
               <a:rPr lang="en-US" dirty="0"/>
               <a:pPr/>
-              <a:t>3/28/2022</a:t>
+              <a:t>3/29/2022</a:t>
             </a:fld>
             <a:endParaRPr lang="en-US" dirty="0"/>
           </a:p>
@@ -4192,7 +4192,7 @@
             <a:fld id="{B61BEF0D-F0BB-DE4B-95CE-6DB70DBA9567}" type="datetimeFigureOut">
               <a:rPr lang="en-US" dirty="0"/>
               <a:pPr/>
-              <a:t>3/28/2022</a:t>
+              <a:t>3/29/2022</a:t>
             </a:fld>
             <a:endParaRPr lang="en-US" dirty="0"/>
           </a:p>
@@ -4507,7 +4507,7 @@
             <a:fld id="{B61BEF0D-F0BB-DE4B-95CE-6DB70DBA9567}" type="datetimeFigureOut">
               <a:rPr lang="en-US" dirty="0"/>
               <a:pPr/>
-              <a:t>3/28/2022</a:t>
+              <a:t>3/29/2022</a:t>
             </a:fld>
             <a:endParaRPr lang="en-US" dirty="0"/>
           </a:p>
@@ -4901,7 +4901,7 @@
             <a:fld id="{B61BEF0D-F0BB-DE4B-95CE-6DB70DBA9567}" type="datetimeFigureOut">
               <a:rPr lang="en-US" dirty="0"/>
               <a:pPr/>
-              <a:t>3/28/2022</a:t>
+              <a:t>3/29/2022</a:t>
             </a:fld>
             <a:endParaRPr lang="en-US" dirty="0"/>
           </a:p>
@@ -5070,7 +5070,7 @@
           <a:p>
             <a:fld id="{70DDF080-5E8C-48AD-84E5-6C08B304C14E}" type="datetimeFigureOut">
               <a:rPr lang="en-US" dirty="0"/>
-              <a:t>3/28/2022</a:t>
+              <a:t>3/29/2022</a:t>
             </a:fld>
             <a:endParaRPr lang="en-US" dirty="0"/>
           </a:p>
@@ -5249,7 +5249,7 @@
             <a:fld id="{B61BEF0D-F0BB-DE4B-95CE-6DB70DBA9567}" type="datetimeFigureOut">
               <a:rPr lang="en-US" dirty="0"/>
               <a:pPr/>
-              <a:t>3/28/2022</a:t>
+              <a:t>3/29/2022</a:t>
             </a:fld>
             <a:endParaRPr lang="en-US" dirty="0"/>
           </a:p>
@@ -5418,7 +5418,7 @@
           <a:p>
             <a:fld id="{70DDF080-5E8C-48AD-84E5-6C08B304C14E}" type="datetimeFigureOut">
               <a:rPr lang="en-US" dirty="0"/>
-              <a:t>3/28/2022</a:t>
+              <a:t>3/29/2022</a:t>
             </a:fld>
             <a:endParaRPr lang="en-US" dirty="0"/>
           </a:p>
@@ -5665,7 +5665,7 @@
             <a:fld id="{B61BEF0D-F0BB-DE4B-95CE-6DB70DBA9567}" type="datetimeFigureOut">
               <a:rPr lang="en-US" dirty="0"/>
               <a:pPr/>
-              <a:t>3/28/2022</a:t>
+              <a:t>3/29/2022</a:t>
             </a:fld>
             <a:endParaRPr lang="en-US" dirty="0"/>
           </a:p>
@@ -5961,7 +5961,7 @@
             <a:fld id="{B61BEF0D-F0BB-DE4B-95CE-6DB70DBA9567}" type="datetimeFigureOut">
               <a:rPr lang="en-US" dirty="0"/>
               <a:pPr/>
-              <a:t>3/28/2022</a:t>
+              <a:t>3/29/2022</a:t>
             </a:fld>
             <a:endParaRPr lang="en-US" dirty="0"/>
           </a:p>
@@ -6339,7 +6339,7 @@
             <a:fld id="{B61BEF0D-F0BB-DE4B-95CE-6DB70DBA9567}" type="datetimeFigureOut">
               <a:rPr lang="en-US" dirty="0"/>
               <a:pPr/>
-              <a:t>3/28/2022</a:t>
+              <a:t>3/29/2022</a:t>
             </a:fld>
             <a:endParaRPr lang="en-US" dirty="0"/>
           </a:p>
@@ -6463,7 +6463,7 @@
             <a:fld id="{B61BEF0D-F0BB-DE4B-95CE-6DB70DBA9567}" type="datetimeFigureOut">
               <a:rPr lang="en-US" dirty="0"/>
               <a:pPr/>
-              <a:t>3/28/2022</a:t>
+              <a:t>3/29/2022</a:t>
             </a:fld>
             <a:endParaRPr lang="en-US" dirty="0"/>
           </a:p>
@@ -6560,7 +6560,7 @@
             <a:fld id="{B61BEF0D-F0BB-DE4B-95CE-6DB70DBA9567}" type="datetimeFigureOut">
               <a:rPr lang="en-US" dirty="0"/>
               <a:pPr/>
-              <a:t>3/28/2022</a:t>
+              <a:t>3/29/2022</a:t>
             </a:fld>
             <a:endParaRPr lang="en-US" dirty="0"/>
           </a:p>
@@ -6814,7 +6814,7 @@
           <a:p>
             <a:fld id="{70DDF080-5E8C-48AD-84E5-6C08B304C14E}" type="datetimeFigureOut">
               <a:rPr lang="en-US" dirty="0"/>
-              <a:t>3/28/2022</a:t>
+              <a:t>3/29/2022</a:t>
             </a:fld>
             <a:endParaRPr lang="en-US" dirty="0"/>
           </a:p>
@@ -7073,7 +7073,7 @@
             <a:fld id="{B61BEF0D-F0BB-DE4B-95CE-6DB70DBA9567}" type="datetimeFigureOut">
               <a:rPr lang="en-US" dirty="0"/>
               <a:pPr/>
-              <a:t>3/28/2022</a:t>
+              <a:t>3/29/2022</a:t>
             </a:fld>
             <a:endParaRPr lang="en-US" dirty="0"/>
           </a:p>
@@ -7887,7 +7887,7 @@
             <a:fld id="{B61BEF0D-F0BB-DE4B-95CE-6DB70DBA9567}" type="datetimeFigureOut">
               <a:rPr lang="en-US" dirty="0"/>
               <a:pPr/>
-              <a:t>3/28/2022</a:t>
+              <a:t>3/29/2022</a:t>
             </a:fld>
             <a:endParaRPr lang="en-US" dirty="0"/>
           </a:p>
@@ -8780,7 +8780,6 @@
               <a:rPr lang="en-US" dirty="0"/>
               <a:t>A circle image is used as Input predict image, theoretically belongs to the trained dataset.</a:t>
             </a:r>
-            <a:endParaRPr lang="en-US"/>
           </a:p>
           <a:p>
             <a:pPr marL="285750" indent="-285750" algn="just">
@@ -8789,7 +8788,7 @@
             </a:pPr>
             <a:r>
               <a:rPr lang="en-US" dirty="0"/>
-              <a:t>The training model is able to predict the feature in the prediction image as circle with an average similarity of 73.26%</a:t>
+              <a:t>The training model can predict the feature in the prediction image as circle with an average similarity of 73.26%</a:t>
             </a:r>
           </a:p>
           <a:p>
@@ -9015,7 +9014,7 @@
                 <a:ea typeface="+mn-lt"/>
                 <a:cs typeface="+mn-lt"/>
               </a:rPr>
-              <a:t>The training model is able to predict the feature in the prediction image as rectangle with an average similarity of 71.07%</a:t>
+              <a:t>The training model can predict the feature in the prediction image as rectangle with an average similarity of 71.07%</a:t>
             </a:r>
           </a:p>
         </p:txBody>
@@ -9393,6 +9392,12 @@
             <a:r>
               <a:rPr lang="en-US" dirty="0"/>
               <a:t> parameters for effective learning.</a:t>
+            </a:r>
+          </a:p>
+          <a:p>
+            <a:r>
+              <a:rPr lang="en-US" dirty="0"/>
+              <a:t>The Image Dimensions influence the Potential Radius</a:t>
             </a:r>
           </a:p>
           <a:p>

</xml_diff>